<commit_message>
Biegemoment VZ korrigiert und Torsionsmomentenverlauf erstellt
</commit_message>
<xml_diff>
--- a/Grafiken.pptx
+++ b/Grafiken.pptx
@@ -9,6 +9,7 @@
     <p:sldId id="257" r:id="rId3"/>
     <p:sldId id="258" r:id="rId4"/>
     <p:sldId id="259" r:id="rId5"/>
+    <p:sldId id="260" r:id="rId6"/>
   </p:sldIdLst>
   <p:sldSz cx="12192000" cy="6858000"/>
   <p:notesSz cx="6858000" cy="9144000"/>
@@ -6533,6 +6534,708 @@
 </p:sld>
 </file>
 
+<file path=ppt/slides/slide5.xml><?xml version="1.0" encoding="utf-8"?>
+<p:sld xmlns:a="http://schemas.openxmlformats.org/drawingml/2006/main" xmlns:r="http://schemas.openxmlformats.org/officeDocument/2006/relationships" xmlns:p="http://schemas.openxmlformats.org/presentationml/2006/main">
+  <p:cSld>
+    <p:spTree>
+      <p:nvGrpSpPr>
+        <p:cNvPr id="1" name=""/>
+        <p:cNvGrpSpPr/>
+        <p:nvPr/>
+      </p:nvGrpSpPr>
+      <p:grpSpPr>
+        <a:xfrm>
+          <a:off x="0" y="0"/>
+          <a:ext cx="0" cy="0"/>
+          <a:chOff x="0" y="0"/>
+          <a:chExt cx="0" cy="0"/>
+        </a:xfrm>
+      </p:grpSpPr>
+      <p:sp>
+        <p:nvSpPr>
+          <p:cNvPr id="5" name="Rechteck 4">
+            <a:extLst>
+              <a:ext uri="{FF2B5EF4-FFF2-40B4-BE49-F238E27FC236}">
+                <a16:creationId xmlns:a16="http://schemas.microsoft.com/office/drawing/2014/main" id="{DED36884-F986-4734-9114-90B3726D3911}"/>
+              </a:ext>
+            </a:extLst>
+          </p:cNvPr>
+          <p:cNvSpPr/>
+          <p:nvPr/>
+        </p:nvSpPr>
+        <p:spPr>
+          <a:xfrm>
+            <a:off x="2736567" y="2687052"/>
+            <a:ext cx="648000" cy="216000"/>
+          </a:xfrm>
+          <a:prstGeom prst="rect">
+            <a:avLst/>
+          </a:prstGeom>
+          <a:solidFill>
+            <a:schemeClr val="bg1"/>
+          </a:solidFill>
+          <a:ln w="3175">
+            <a:solidFill>
+              <a:schemeClr val="tx1"/>
+            </a:solidFill>
+          </a:ln>
+        </p:spPr>
+        <p:style>
+          <a:lnRef idx="2">
+            <a:schemeClr val="accent1">
+              <a:shade val="50000"/>
+            </a:schemeClr>
+          </a:lnRef>
+          <a:fillRef idx="1">
+            <a:schemeClr val="accent1"/>
+          </a:fillRef>
+          <a:effectRef idx="0">
+            <a:schemeClr val="accent1"/>
+          </a:effectRef>
+          <a:fontRef idx="minor">
+            <a:schemeClr val="lt1"/>
+          </a:fontRef>
+        </p:style>
+        <p:txBody>
+          <a:bodyPr rtlCol="0" anchor="ctr"/>
+          <a:lstStyle/>
+          <a:p>
+            <a:pPr algn="ctr"/>
+            <a:endParaRPr lang="de-DE"/>
+          </a:p>
+        </p:txBody>
+      </p:sp>
+      <p:sp>
+        <p:nvSpPr>
+          <p:cNvPr id="4" name="Rechteck 3">
+            <a:extLst>
+              <a:ext uri="{FF2B5EF4-FFF2-40B4-BE49-F238E27FC236}">
+                <a16:creationId xmlns:a16="http://schemas.microsoft.com/office/drawing/2014/main" id="{D79D1553-633E-457F-BE19-3966945D0A8F}"/>
+              </a:ext>
+            </a:extLst>
+          </p:cNvPr>
+          <p:cNvSpPr/>
+          <p:nvPr/>
+        </p:nvSpPr>
+        <p:spPr>
+          <a:xfrm>
+            <a:off x="3384567" y="2687053"/>
+            <a:ext cx="396000" cy="432000"/>
+          </a:xfrm>
+          <a:prstGeom prst="rect">
+            <a:avLst/>
+          </a:prstGeom>
+          <a:solidFill>
+            <a:schemeClr val="bg1"/>
+          </a:solidFill>
+          <a:ln w="3175">
+            <a:solidFill>
+              <a:schemeClr val="tx1"/>
+            </a:solidFill>
+          </a:ln>
+        </p:spPr>
+        <p:style>
+          <a:lnRef idx="2">
+            <a:schemeClr val="accent1">
+              <a:shade val="50000"/>
+            </a:schemeClr>
+          </a:lnRef>
+          <a:fillRef idx="1">
+            <a:schemeClr val="accent1"/>
+          </a:fillRef>
+          <a:effectRef idx="0">
+            <a:schemeClr val="accent1"/>
+          </a:effectRef>
+          <a:fontRef idx="minor">
+            <a:schemeClr val="lt1"/>
+          </a:fontRef>
+        </p:style>
+        <p:txBody>
+          <a:bodyPr rtlCol="0" anchor="ctr"/>
+          <a:lstStyle/>
+          <a:p>
+            <a:pPr algn="ctr"/>
+            <a:endParaRPr lang="de-DE"/>
+          </a:p>
+        </p:txBody>
+      </p:sp>
+      <p:cxnSp>
+        <p:nvCxnSpPr>
+          <p:cNvPr id="3" name="Gerader Verbinder 2">
+            <a:extLst>
+              <a:ext uri="{FF2B5EF4-FFF2-40B4-BE49-F238E27FC236}">
+                <a16:creationId xmlns:a16="http://schemas.microsoft.com/office/drawing/2014/main" id="{1250052E-CE76-4C37-BCE4-97AD7A2559A4}"/>
+              </a:ext>
+            </a:extLst>
+          </p:cNvPr>
+          <p:cNvCxnSpPr/>
+          <p:nvPr/>
+        </p:nvCxnSpPr>
+        <p:spPr>
+          <a:xfrm>
+            <a:off x="2502567" y="2687053"/>
+            <a:ext cx="1278000" cy="0"/>
+          </a:xfrm>
+          <a:prstGeom prst="line">
+            <a:avLst/>
+          </a:prstGeom>
+          <a:ln w="38100">
+            <a:solidFill>
+              <a:schemeClr val="tx1"/>
+            </a:solidFill>
+          </a:ln>
+        </p:spPr>
+        <p:style>
+          <a:lnRef idx="1">
+            <a:schemeClr val="accent1"/>
+          </a:lnRef>
+          <a:fillRef idx="0">
+            <a:schemeClr val="accent1"/>
+          </a:fillRef>
+          <a:effectRef idx="0">
+            <a:schemeClr val="accent1"/>
+          </a:effectRef>
+          <a:fontRef idx="minor">
+            <a:schemeClr val="tx1"/>
+          </a:fontRef>
+        </p:style>
+      </p:cxnSp>
+      <p:sp>
+        <p:nvSpPr>
+          <p:cNvPr id="6" name="Textfeld 5">
+            <a:extLst>
+              <a:ext uri="{FF2B5EF4-FFF2-40B4-BE49-F238E27FC236}">
+                <a16:creationId xmlns:a16="http://schemas.microsoft.com/office/drawing/2014/main" id="{0485B196-4F97-402E-A841-7AE30AA7BFB6}"/>
+              </a:ext>
+            </a:extLst>
+          </p:cNvPr>
+          <p:cNvSpPr txBox="1"/>
+          <p:nvPr/>
+        </p:nvSpPr>
+        <p:spPr>
+          <a:xfrm>
+            <a:off x="2818267" y="2717826"/>
+            <a:ext cx="736600" cy="184666"/>
+          </a:xfrm>
+          <a:prstGeom prst="rect">
+            <a:avLst/>
+          </a:prstGeom>
+          <a:noFill/>
+        </p:spPr>
+        <p:txBody>
+          <a:bodyPr wrap="square" rtlCol="0">
+            <a:spAutoFit/>
+          </a:bodyPr>
+          <a:lstStyle/>
+          <a:p>
+            <a:r>
+              <a:rPr lang="de-DE" sz="600" dirty="0"/>
+              <a:t>T</a:t>
+            </a:r>
+            <a:r>
+              <a:rPr lang="de-DE" sz="200" dirty="0"/>
+              <a:t>2</a:t>
+            </a:r>
+            <a:r>
+              <a:rPr lang="de-DE" sz="600" dirty="0"/>
+              <a:t>=120Nm</a:t>
+            </a:r>
+          </a:p>
+        </p:txBody>
+      </p:sp>
+      <p:sp>
+        <p:nvSpPr>
+          <p:cNvPr id="7" name="Textfeld 6">
+            <a:extLst>
+              <a:ext uri="{FF2B5EF4-FFF2-40B4-BE49-F238E27FC236}">
+                <a16:creationId xmlns:a16="http://schemas.microsoft.com/office/drawing/2014/main" id="{AF80A6D4-7E54-46C5-A3C4-F3FED4910D79}"/>
+              </a:ext>
+            </a:extLst>
+          </p:cNvPr>
+          <p:cNvSpPr txBox="1"/>
+          <p:nvPr/>
+        </p:nvSpPr>
+        <p:spPr>
+          <a:xfrm>
+            <a:off x="3412267" y="2763992"/>
+            <a:ext cx="736600" cy="276999"/>
+          </a:xfrm>
+          <a:prstGeom prst="rect">
+            <a:avLst/>
+          </a:prstGeom>
+          <a:noFill/>
+        </p:spPr>
+        <p:txBody>
+          <a:bodyPr wrap="square" rtlCol="0">
+            <a:spAutoFit/>
+          </a:bodyPr>
+          <a:lstStyle/>
+          <a:p>
+            <a:r>
+              <a:rPr lang="de-DE" sz="600" dirty="0"/>
+              <a:t>T</a:t>
+            </a:r>
+            <a:r>
+              <a:rPr lang="de-DE" sz="200" dirty="0"/>
+              <a:t>3</a:t>
+            </a:r>
+            <a:r>
+              <a:rPr lang="de-DE" sz="600" dirty="0"/>
+              <a:t>=T</a:t>
+            </a:r>
+            <a:r>
+              <a:rPr lang="de-DE" sz="200" dirty="0"/>
+              <a:t>4</a:t>
+            </a:r>
+            <a:r>
+              <a:rPr lang="de-DE" sz="600" dirty="0"/>
+              <a:t>=</a:t>
+            </a:r>
+          </a:p>
+          <a:p>
+            <a:r>
+              <a:rPr lang="de-DE" sz="600" dirty="0"/>
+              <a:t>240Nm</a:t>
+            </a:r>
+          </a:p>
+        </p:txBody>
+      </p:sp>
+      <p:sp>
+        <p:nvSpPr>
+          <p:cNvPr id="10" name="Textfeld 9">
+            <a:extLst>
+              <a:ext uri="{FF2B5EF4-FFF2-40B4-BE49-F238E27FC236}">
+                <a16:creationId xmlns:a16="http://schemas.microsoft.com/office/drawing/2014/main" id="{A34CE71D-182E-4919-9015-C26A760E9A73}"/>
+              </a:ext>
+            </a:extLst>
+          </p:cNvPr>
+          <p:cNvSpPr txBox="1"/>
+          <p:nvPr/>
+        </p:nvSpPr>
+        <p:spPr>
+          <a:xfrm>
+            <a:off x="2307367" y="2706127"/>
+            <a:ext cx="736600" cy="184666"/>
+          </a:xfrm>
+          <a:prstGeom prst="rect">
+            <a:avLst/>
+          </a:prstGeom>
+          <a:noFill/>
+        </p:spPr>
+        <p:txBody>
+          <a:bodyPr wrap="square" rtlCol="0">
+            <a:spAutoFit/>
+          </a:bodyPr>
+          <a:lstStyle/>
+          <a:p>
+            <a:r>
+              <a:rPr lang="de-DE" sz="600" dirty="0"/>
+              <a:t>T</a:t>
+            </a:r>
+            <a:r>
+              <a:rPr lang="de-DE" sz="200" dirty="0"/>
+              <a:t>1</a:t>
+            </a:r>
+            <a:r>
+              <a:rPr lang="de-DE" sz="600" dirty="0"/>
+              <a:t>=0Nm</a:t>
+            </a:r>
+          </a:p>
+        </p:txBody>
+      </p:sp>
+      <p:cxnSp>
+        <p:nvCxnSpPr>
+          <p:cNvPr id="11" name="Gerade Verbindung mit Pfeil 10">
+            <a:extLst>
+              <a:ext uri="{FF2B5EF4-FFF2-40B4-BE49-F238E27FC236}">
+                <a16:creationId xmlns:a16="http://schemas.microsoft.com/office/drawing/2014/main" id="{8027C559-094D-44C0-8A1C-A87E7BBB8F78}"/>
+              </a:ext>
+            </a:extLst>
+          </p:cNvPr>
+          <p:cNvCxnSpPr>
+            <a:cxnSpLocks/>
+          </p:cNvCxnSpPr>
+          <p:nvPr/>
+        </p:nvCxnSpPr>
+        <p:spPr>
+          <a:xfrm>
+            <a:off x="2502567" y="2536929"/>
+            <a:ext cx="234000" cy="0"/>
+          </a:xfrm>
+          <a:prstGeom prst="straightConnector1">
+            <a:avLst/>
+          </a:prstGeom>
+          <a:ln>
+            <a:headEnd type="triangle" w="sm" len="sm"/>
+            <a:tailEnd type="triangle" w="sm" len="sm"/>
+          </a:ln>
+        </p:spPr>
+        <p:style>
+          <a:lnRef idx="1">
+            <a:schemeClr val="accent1"/>
+          </a:lnRef>
+          <a:fillRef idx="0">
+            <a:schemeClr val="accent1"/>
+          </a:fillRef>
+          <a:effectRef idx="0">
+            <a:schemeClr val="accent1"/>
+          </a:effectRef>
+          <a:fontRef idx="minor">
+            <a:schemeClr val="tx1"/>
+          </a:fontRef>
+        </p:style>
+      </p:cxnSp>
+      <p:cxnSp>
+        <p:nvCxnSpPr>
+          <p:cNvPr id="12" name="Gerade Verbindung mit Pfeil 11">
+            <a:extLst>
+              <a:ext uri="{FF2B5EF4-FFF2-40B4-BE49-F238E27FC236}">
+                <a16:creationId xmlns:a16="http://schemas.microsoft.com/office/drawing/2014/main" id="{CEBFCD90-2926-490C-9CBE-662467F982CF}"/>
+              </a:ext>
+            </a:extLst>
+          </p:cNvPr>
+          <p:cNvCxnSpPr>
+            <a:cxnSpLocks/>
+          </p:cNvCxnSpPr>
+          <p:nvPr/>
+        </p:nvCxnSpPr>
+        <p:spPr>
+          <a:xfrm>
+            <a:off x="3610267" y="2531079"/>
+            <a:ext cx="170300" cy="0"/>
+          </a:xfrm>
+          <a:prstGeom prst="straightConnector1">
+            <a:avLst/>
+          </a:prstGeom>
+          <a:ln>
+            <a:headEnd type="triangle" w="sm" len="sm"/>
+            <a:tailEnd type="triangle" w="sm" len="sm"/>
+          </a:ln>
+        </p:spPr>
+        <p:style>
+          <a:lnRef idx="1">
+            <a:schemeClr val="accent1"/>
+          </a:lnRef>
+          <a:fillRef idx="0">
+            <a:schemeClr val="accent1"/>
+          </a:fillRef>
+          <a:effectRef idx="0">
+            <a:schemeClr val="accent1"/>
+          </a:effectRef>
+          <a:fontRef idx="minor">
+            <a:schemeClr val="tx1"/>
+          </a:fontRef>
+        </p:style>
+      </p:cxnSp>
+      <p:cxnSp>
+        <p:nvCxnSpPr>
+          <p:cNvPr id="13" name="Gerade Verbindung mit Pfeil 12">
+            <a:extLst>
+              <a:ext uri="{FF2B5EF4-FFF2-40B4-BE49-F238E27FC236}">
+                <a16:creationId xmlns:a16="http://schemas.microsoft.com/office/drawing/2014/main" id="{6D6F7A55-B3AC-4A6D-94D2-98A6E801C59A}"/>
+              </a:ext>
+            </a:extLst>
+          </p:cNvPr>
+          <p:cNvCxnSpPr>
+            <a:cxnSpLocks/>
+          </p:cNvCxnSpPr>
+          <p:nvPr/>
+        </p:nvCxnSpPr>
+        <p:spPr>
+          <a:xfrm flipV="1">
+            <a:off x="3412267" y="2531079"/>
+            <a:ext cx="198000" cy="6715"/>
+          </a:xfrm>
+          <a:prstGeom prst="straightConnector1">
+            <a:avLst/>
+          </a:prstGeom>
+          <a:ln>
+            <a:headEnd type="triangle" w="sm" len="sm"/>
+            <a:tailEnd type="triangle" w="sm" len="sm"/>
+          </a:ln>
+        </p:spPr>
+        <p:style>
+          <a:lnRef idx="1">
+            <a:schemeClr val="accent1"/>
+          </a:lnRef>
+          <a:fillRef idx="0">
+            <a:schemeClr val="accent1"/>
+          </a:fillRef>
+          <a:effectRef idx="0">
+            <a:schemeClr val="accent1"/>
+          </a:effectRef>
+          <a:fontRef idx="minor">
+            <a:schemeClr val="tx1"/>
+          </a:fontRef>
+        </p:style>
+      </p:cxnSp>
+      <p:cxnSp>
+        <p:nvCxnSpPr>
+          <p:cNvPr id="14" name="Gerade Verbindung mit Pfeil 13">
+            <a:extLst>
+              <a:ext uri="{FF2B5EF4-FFF2-40B4-BE49-F238E27FC236}">
+                <a16:creationId xmlns:a16="http://schemas.microsoft.com/office/drawing/2014/main" id="{782C1408-D9EA-493E-9259-176FDF5163EC}"/>
+              </a:ext>
+            </a:extLst>
+          </p:cNvPr>
+          <p:cNvCxnSpPr>
+            <a:cxnSpLocks/>
+          </p:cNvCxnSpPr>
+          <p:nvPr/>
+        </p:nvCxnSpPr>
+        <p:spPr>
+          <a:xfrm>
+            <a:off x="2736567" y="2537795"/>
+            <a:ext cx="675700" cy="0"/>
+          </a:xfrm>
+          <a:prstGeom prst="straightConnector1">
+            <a:avLst/>
+          </a:prstGeom>
+          <a:ln>
+            <a:headEnd type="triangle" w="sm" len="sm"/>
+            <a:tailEnd type="triangle" w="sm" len="sm"/>
+          </a:ln>
+        </p:spPr>
+        <p:style>
+          <a:lnRef idx="1">
+            <a:schemeClr val="accent1"/>
+          </a:lnRef>
+          <a:fillRef idx="0">
+            <a:schemeClr val="accent1"/>
+          </a:fillRef>
+          <a:effectRef idx="0">
+            <a:schemeClr val="accent1"/>
+          </a:effectRef>
+          <a:fontRef idx="minor">
+            <a:schemeClr val="tx1"/>
+          </a:fontRef>
+        </p:style>
+      </p:cxnSp>
+      <p:sp>
+        <p:nvSpPr>
+          <p:cNvPr id="19" name="Textfeld 18">
+            <a:extLst>
+              <a:ext uri="{FF2B5EF4-FFF2-40B4-BE49-F238E27FC236}">
+                <a16:creationId xmlns:a16="http://schemas.microsoft.com/office/drawing/2014/main" id="{117CFCC0-43CF-4716-8794-23A7922E2AA6}"/>
+              </a:ext>
+            </a:extLst>
+          </p:cNvPr>
+          <p:cNvSpPr txBox="1"/>
+          <p:nvPr/>
+        </p:nvSpPr>
+        <p:spPr>
+          <a:xfrm>
+            <a:off x="2600360" y="2362649"/>
+            <a:ext cx="954507" cy="169277"/>
+          </a:xfrm>
+          <a:prstGeom prst="rect">
+            <a:avLst/>
+          </a:prstGeom>
+          <a:noFill/>
+        </p:spPr>
+        <p:txBody>
+          <a:bodyPr wrap="square" rtlCol="0">
+            <a:spAutoFit/>
+          </a:bodyPr>
+          <a:lstStyle/>
+          <a:p>
+            <a:pPr algn="ctr"/>
+            <a:r>
+              <a:rPr lang="de-DE" sz="500" dirty="0">
+                <a:latin typeface="Arial" panose="020B0604020202020204" pitchFamily="34" charset="0"/>
+                <a:cs typeface="Arial" panose="020B0604020202020204" pitchFamily="34" charset="0"/>
+              </a:rPr>
+              <a:t>L</a:t>
+            </a:r>
+            <a:r>
+              <a:rPr lang="de-DE" sz="300" dirty="0">
+                <a:latin typeface="Arial" panose="020B0604020202020204" pitchFamily="34" charset="0"/>
+                <a:cs typeface="Arial" panose="020B0604020202020204" pitchFamily="34" charset="0"/>
+              </a:rPr>
+              <a:t>II</a:t>
+            </a:r>
+            <a:r>
+              <a:rPr lang="de-DE" sz="500" dirty="0">
+                <a:latin typeface="Arial" panose="020B0604020202020204" pitchFamily="34" charset="0"/>
+                <a:cs typeface="Arial" panose="020B0604020202020204" pitchFamily="34" charset="0"/>
+              </a:rPr>
+              <a:t>=180</a:t>
+            </a:r>
+          </a:p>
+        </p:txBody>
+      </p:sp>
+      <p:sp>
+        <p:nvSpPr>
+          <p:cNvPr id="20" name="Textfeld 19">
+            <a:extLst>
+              <a:ext uri="{FF2B5EF4-FFF2-40B4-BE49-F238E27FC236}">
+                <a16:creationId xmlns:a16="http://schemas.microsoft.com/office/drawing/2014/main" id="{DEB576D0-C61B-40B3-9A2E-9E96AFACBF00}"/>
+              </a:ext>
+            </a:extLst>
+          </p:cNvPr>
+          <p:cNvSpPr txBox="1"/>
+          <p:nvPr/>
+        </p:nvSpPr>
+        <p:spPr>
+          <a:xfrm>
+            <a:off x="2230546" y="2374908"/>
+            <a:ext cx="778043" cy="169277"/>
+          </a:xfrm>
+          <a:prstGeom prst="rect">
+            <a:avLst/>
+          </a:prstGeom>
+          <a:noFill/>
+        </p:spPr>
+        <p:txBody>
+          <a:bodyPr wrap="square" rtlCol="0">
+            <a:spAutoFit/>
+          </a:bodyPr>
+          <a:lstStyle/>
+          <a:p>
+            <a:pPr algn="ctr"/>
+            <a:r>
+              <a:rPr lang="de-DE" sz="500" dirty="0">
+                <a:latin typeface="Arial" panose="020B0604020202020204" pitchFamily="34" charset="0"/>
+                <a:cs typeface="Arial" panose="020B0604020202020204" pitchFamily="34" charset="0"/>
+              </a:rPr>
+              <a:t>L</a:t>
+            </a:r>
+            <a:r>
+              <a:rPr lang="de-DE" sz="300" dirty="0">
+                <a:latin typeface="Arial" panose="020B0604020202020204" pitchFamily="34" charset="0"/>
+                <a:cs typeface="Arial" panose="020B0604020202020204" pitchFamily="34" charset="0"/>
+              </a:rPr>
+              <a:t>I</a:t>
+            </a:r>
+            <a:r>
+              <a:rPr lang="de-DE" sz="500" dirty="0">
+                <a:latin typeface="Arial" panose="020B0604020202020204" pitchFamily="34" charset="0"/>
+                <a:cs typeface="Arial" panose="020B0604020202020204" pitchFamily="34" charset="0"/>
+              </a:rPr>
+              <a:t>=55</a:t>
+            </a:r>
+          </a:p>
+        </p:txBody>
+      </p:sp>
+      <p:sp>
+        <p:nvSpPr>
+          <p:cNvPr id="21" name="Textfeld 20">
+            <a:extLst>
+              <a:ext uri="{FF2B5EF4-FFF2-40B4-BE49-F238E27FC236}">
+                <a16:creationId xmlns:a16="http://schemas.microsoft.com/office/drawing/2014/main" id="{86970C7E-C3C5-4F62-ABED-74FC8B5277E5}"/>
+              </a:ext>
+            </a:extLst>
+          </p:cNvPr>
+          <p:cNvSpPr txBox="1"/>
+          <p:nvPr/>
+        </p:nvSpPr>
+        <p:spPr>
+          <a:xfrm>
+            <a:off x="3312228" y="2362648"/>
+            <a:ext cx="378253" cy="169277"/>
+          </a:xfrm>
+          <a:prstGeom prst="rect">
+            <a:avLst/>
+          </a:prstGeom>
+          <a:noFill/>
+        </p:spPr>
+        <p:txBody>
+          <a:bodyPr wrap="square" rtlCol="0">
+            <a:spAutoFit/>
+          </a:bodyPr>
+          <a:lstStyle/>
+          <a:p>
+            <a:pPr algn="ctr"/>
+            <a:r>
+              <a:rPr lang="de-DE" sz="500" dirty="0">
+                <a:latin typeface="Arial" panose="020B0604020202020204" pitchFamily="34" charset="0"/>
+                <a:cs typeface="Arial" panose="020B0604020202020204" pitchFamily="34" charset="0"/>
+              </a:rPr>
+              <a:t>L</a:t>
+            </a:r>
+            <a:r>
+              <a:rPr lang="de-DE" sz="300" dirty="0">
+                <a:latin typeface="Arial" panose="020B0604020202020204" pitchFamily="34" charset="0"/>
+                <a:cs typeface="Arial" panose="020B0604020202020204" pitchFamily="34" charset="0"/>
+              </a:rPr>
+              <a:t>III</a:t>
+            </a:r>
+            <a:r>
+              <a:rPr lang="de-DE" sz="500" dirty="0">
+                <a:latin typeface="Arial" panose="020B0604020202020204" pitchFamily="34" charset="0"/>
+                <a:cs typeface="Arial" panose="020B0604020202020204" pitchFamily="34" charset="0"/>
+              </a:rPr>
+              <a:t>=55</a:t>
+            </a:r>
+          </a:p>
+        </p:txBody>
+      </p:sp>
+      <p:sp>
+        <p:nvSpPr>
+          <p:cNvPr id="22" name="Textfeld 21">
+            <a:extLst>
+              <a:ext uri="{FF2B5EF4-FFF2-40B4-BE49-F238E27FC236}">
+                <a16:creationId xmlns:a16="http://schemas.microsoft.com/office/drawing/2014/main" id="{6A6A44E9-EF16-4E53-9EB2-C72D7C4D0168}"/>
+              </a:ext>
+            </a:extLst>
+          </p:cNvPr>
+          <p:cNvSpPr txBox="1"/>
+          <p:nvPr/>
+        </p:nvSpPr>
+        <p:spPr>
+          <a:xfrm>
+            <a:off x="3511267" y="2361242"/>
+            <a:ext cx="377807" cy="169277"/>
+          </a:xfrm>
+          <a:prstGeom prst="rect">
+            <a:avLst/>
+          </a:prstGeom>
+          <a:noFill/>
+        </p:spPr>
+        <p:txBody>
+          <a:bodyPr wrap="square" rtlCol="0">
+            <a:spAutoFit/>
+          </a:bodyPr>
+          <a:lstStyle/>
+          <a:p>
+            <a:pPr algn="ctr"/>
+            <a:r>
+              <a:rPr lang="de-DE" sz="500" dirty="0">
+                <a:latin typeface="Arial" panose="020B0604020202020204" pitchFamily="34" charset="0"/>
+                <a:cs typeface="Arial" panose="020B0604020202020204" pitchFamily="34" charset="0"/>
+              </a:rPr>
+              <a:t>L</a:t>
+            </a:r>
+            <a:r>
+              <a:rPr lang="de-DE" sz="300" dirty="0">
+                <a:latin typeface="Arial" panose="020B0604020202020204" pitchFamily="34" charset="0"/>
+                <a:cs typeface="Arial" panose="020B0604020202020204" pitchFamily="34" charset="0"/>
+              </a:rPr>
+              <a:t>IV</a:t>
+            </a:r>
+            <a:r>
+              <a:rPr lang="de-DE" sz="500" dirty="0">
+                <a:latin typeface="Arial" panose="020B0604020202020204" pitchFamily="34" charset="0"/>
+                <a:cs typeface="Arial" panose="020B0604020202020204" pitchFamily="34" charset="0"/>
+              </a:rPr>
+              <a:t>=65</a:t>
+            </a:r>
+          </a:p>
+        </p:txBody>
+      </p:sp>
+    </p:spTree>
+    <p:extLst>
+      <p:ext uri="{BB962C8B-B14F-4D97-AF65-F5344CB8AC3E}">
+        <p14:creationId xmlns:p14="http://schemas.microsoft.com/office/powerpoint/2010/main" val="2021752976"/>
+      </p:ext>
+    </p:extLst>
+  </p:cSld>
+  <p:clrMapOvr>
+    <a:masterClrMapping/>
+  </p:clrMapOvr>
+</p:sld>
+</file>
+
 <file path=ppt/theme/theme1.xml><?xml version="1.0" encoding="utf-8"?>
 <a:theme xmlns:a="http://schemas.openxmlformats.org/drawingml/2006/main" name="Office">
   <a:themeElements>

</xml_diff>

<commit_message>
Deckelerläuterungen, Grafiken auf neue Maße angepasst
Grafiken im Projektbericht sind noch nicht aktuell!
</commit_message>
<xml_diff>
--- a/Grafiken.pptx
+++ b/Grafiken.pptx
@@ -263,7 +263,7 @@
           <a:p>
             <a:fld id="{1A473A71-948F-4AE8-AF79-80443CCFF2D0}" type="datetimeFigureOut">
               <a:rPr lang="de-DE" smtClean="0"/>
-              <a:t>29.10.2019</a:t>
+              <a:t>05.11.2019</a:t>
             </a:fld>
             <a:endParaRPr lang="de-DE"/>
           </a:p>
@@ -461,7 +461,7 @@
           <a:p>
             <a:fld id="{1A473A71-948F-4AE8-AF79-80443CCFF2D0}" type="datetimeFigureOut">
               <a:rPr lang="de-DE" smtClean="0"/>
-              <a:t>29.10.2019</a:t>
+              <a:t>05.11.2019</a:t>
             </a:fld>
             <a:endParaRPr lang="de-DE"/>
           </a:p>
@@ -669,7 +669,7 @@
           <a:p>
             <a:fld id="{1A473A71-948F-4AE8-AF79-80443CCFF2D0}" type="datetimeFigureOut">
               <a:rPr lang="de-DE" smtClean="0"/>
-              <a:t>29.10.2019</a:t>
+              <a:t>05.11.2019</a:t>
             </a:fld>
             <a:endParaRPr lang="de-DE"/>
           </a:p>
@@ -867,7 +867,7 @@
           <a:p>
             <a:fld id="{1A473A71-948F-4AE8-AF79-80443CCFF2D0}" type="datetimeFigureOut">
               <a:rPr lang="de-DE" smtClean="0"/>
-              <a:t>29.10.2019</a:t>
+              <a:t>05.11.2019</a:t>
             </a:fld>
             <a:endParaRPr lang="de-DE"/>
           </a:p>
@@ -1142,7 +1142,7 @@
           <a:p>
             <a:fld id="{1A473A71-948F-4AE8-AF79-80443CCFF2D0}" type="datetimeFigureOut">
               <a:rPr lang="de-DE" smtClean="0"/>
-              <a:t>29.10.2019</a:t>
+              <a:t>05.11.2019</a:t>
             </a:fld>
             <a:endParaRPr lang="de-DE"/>
           </a:p>
@@ -1407,7 +1407,7 @@
           <a:p>
             <a:fld id="{1A473A71-948F-4AE8-AF79-80443CCFF2D0}" type="datetimeFigureOut">
               <a:rPr lang="de-DE" smtClean="0"/>
-              <a:t>29.10.2019</a:t>
+              <a:t>05.11.2019</a:t>
             </a:fld>
             <a:endParaRPr lang="de-DE"/>
           </a:p>
@@ -1819,7 +1819,7 @@
           <a:p>
             <a:fld id="{1A473A71-948F-4AE8-AF79-80443CCFF2D0}" type="datetimeFigureOut">
               <a:rPr lang="de-DE" smtClean="0"/>
-              <a:t>29.10.2019</a:t>
+              <a:t>05.11.2019</a:t>
             </a:fld>
             <a:endParaRPr lang="de-DE"/>
           </a:p>
@@ -1960,7 +1960,7 @@
           <a:p>
             <a:fld id="{1A473A71-948F-4AE8-AF79-80443CCFF2D0}" type="datetimeFigureOut">
               <a:rPr lang="de-DE" smtClean="0"/>
-              <a:t>29.10.2019</a:t>
+              <a:t>05.11.2019</a:t>
             </a:fld>
             <a:endParaRPr lang="de-DE"/>
           </a:p>
@@ -2073,7 +2073,7 @@
           <a:p>
             <a:fld id="{1A473A71-948F-4AE8-AF79-80443CCFF2D0}" type="datetimeFigureOut">
               <a:rPr lang="de-DE" smtClean="0"/>
-              <a:t>29.10.2019</a:t>
+              <a:t>05.11.2019</a:t>
             </a:fld>
             <a:endParaRPr lang="de-DE"/>
           </a:p>
@@ -2384,7 +2384,7 @@
           <a:p>
             <a:fld id="{1A473A71-948F-4AE8-AF79-80443CCFF2D0}" type="datetimeFigureOut">
               <a:rPr lang="de-DE" smtClean="0"/>
-              <a:t>29.10.2019</a:t>
+              <a:t>05.11.2019</a:t>
             </a:fld>
             <a:endParaRPr lang="de-DE"/>
           </a:p>
@@ -2672,7 +2672,7 @@
           <a:p>
             <a:fld id="{1A473A71-948F-4AE8-AF79-80443CCFF2D0}" type="datetimeFigureOut">
               <a:rPr lang="de-DE" smtClean="0"/>
-              <a:t>29.10.2019</a:t>
+              <a:t>05.11.2019</a:t>
             </a:fld>
             <a:endParaRPr lang="de-DE"/>
           </a:p>
@@ -2913,7 +2913,7 @@
           <a:p>
             <a:fld id="{1A473A71-948F-4AE8-AF79-80443CCFF2D0}" type="datetimeFigureOut">
               <a:rPr lang="de-DE" smtClean="0"/>
-              <a:t>29.10.2019</a:t>
+              <a:t>05.11.2019</a:t>
             </a:fld>
             <a:endParaRPr lang="de-DE"/>
           </a:p>
@@ -4003,7 +4003,7 @@
                 <a:latin typeface="Arial" panose="020B0604020202020204" pitchFamily="34" charset="0"/>
                 <a:cs typeface="Arial" panose="020B0604020202020204" pitchFamily="34" charset="0"/>
               </a:rPr>
-              <a:t>=180</a:t>
+              <a:t>=160</a:t>
             </a:r>
           </a:p>
         </p:txBody>
@@ -4023,7 +4023,7 @@
         <p:spPr>
           <a:xfrm>
             <a:off x="2173703" y="777678"/>
-            <a:ext cx="778043" cy="369332"/>
+            <a:ext cx="954507" cy="369332"/>
           </a:xfrm>
           <a:prstGeom prst="rect">
             <a:avLst/>
@@ -4056,7 +4056,7 @@
                 <a:latin typeface="Arial" panose="020B0604020202020204" pitchFamily="34" charset="0"/>
                 <a:cs typeface="Arial" panose="020B0604020202020204" pitchFamily="34" charset="0"/>
               </a:rPr>
-              <a:t>=55</a:t>
+              <a:t>=65</a:t>
             </a:r>
           </a:p>
         </p:txBody>
@@ -4075,8 +4075,8 @@
         </p:nvSpPr>
         <p:spPr>
           <a:xfrm>
-            <a:off x="5464331" y="791909"/>
-            <a:ext cx="954507" cy="369332"/>
+            <a:off x="5333965" y="789530"/>
+            <a:ext cx="1084859" cy="369332"/>
           </a:xfrm>
           <a:prstGeom prst="rect">
             <a:avLst/>
@@ -4109,7 +4109,7 @@
                 <a:latin typeface="Arial" panose="020B0604020202020204" pitchFamily="34" charset="0"/>
                 <a:cs typeface="Arial" panose="020B0604020202020204" pitchFamily="34" charset="0"/>
               </a:rPr>
-              <a:t>=55</a:t>
+              <a:t>=65</a:t>
             </a:r>
           </a:p>
         </p:txBody>
@@ -6004,7 +6004,7 @@
                   <a:latin typeface="Arial" panose="020B0604020202020204" pitchFamily="34" charset="0"/>
                   <a:cs typeface="Arial" panose="020B0604020202020204" pitchFamily="34" charset="0"/>
                 </a:rPr>
-                <a:t>=180</a:t>
+                <a:t>=160</a:t>
               </a:r>
             </a:p>
           </p:txBody>
@@ -6024,7 +6024,7 @@
           <p:spPr>
             <a:xfrm>
               <a:off x="2173703" y="777678"/>
-              <a:ext cx="778043" cy="369332"/>
+              <a:ext cx="954507" cy="369332"/>
             </a:xfrm>
             <a:prstGeom prst="rect">
               <a:avLst/>
@@ -6057,7 +6057,7 @@
                   <a:latin typeface="Arial" panose="020B0604020202020204" pitchFamily="34" charset="0"/>
                   <a:cs typeface="Arial" panose="020B0604020202020204" pitchFamily="34" charset="0"/>
                 </a:rPr>
-                <a:t>=55</a:t>
+                <a:t>=65</a:t>
               </a:r>
             </a:p>
           </p:txBody>
@@ -6076,8 +6076,8 @@
           </p:nvSpPr>
           <p:spPr>
             <a:xfrm>
-              <a:off x="5464331" y="791909"/>
-              <a:ext cx="954507" cy="369332"/>
+              <a:off x="5374096" y="792916"/>
+              <a:ext cx="1076829" cy="369332"/>
             </a:xfrm>
             <a:prstGeom prst="rect">
               <a:avLst/>
@@ -6110,7 +6110,7 @@
                   <a:latin typeface="Arial" panose="020B0604020202020204" pitchFamily="34" charset="0"/>
                   <a:cs typeface="Arial" panose="020B0604020202020204" pitchFamily="34" charset="0"/>
                 </a:rPr>
-                <a:t>=55</a:t>
+                <a:t>=65</a:t>
               </a:r>
             </a:p>
           </p:txBody>
@@ -6566,7 +6566,7 @@
         <p:spPr>
           <a:xfrm>
             <a:off x="2736567" y="2687052"/>
-            <a:ext cx="648000" cy="216000"/>
+            <a:ext cx="576000" cy="216000"/>
           </a:xfrm>
           <a:prstGeom prst="rect">
             <a:avLst/>
@@ -6601,7 +6601,7 @@
           <a:lstStyle/>
           <a:p>
             <a:pPr algn="ctr"/>
-            <a:endParaRPr lang="de-DE"/>
+            <a:endParaRPr lang="de-DE" dirty="0"/>
           </a:p>
         </p:txBody>
       </p:sp>
@@ -6619,8 +6619,8 @@
         </p:nvSpPr>
         <p:spPr>
           <a:xfrm>
-            <a:off x="3384567" y="2687053"/>
-            <a:ext cx="396000" cy="432000"/>
+            <a:off x="3312567" y="2687052"/>
+            <a:ext cx="468000" cy="432000"/>
           </a:xfrm>
           <a:prstGeom prst="rect">
             <a:avLst/>
@@ -6714,7 +6714,7 @@
         </p:nvSpPr>
         <p:spPr>
           <a:xfrm>
-            <a:off x="2818267" y="2717826"/>
+            <a:off x="2809967" y="2719954"/>
             <a:ext cx="736600" cy="184666"/>
           </a:xfrm>
           <a:prstGeom prst="rect">
@@ -6901,8 +6901,8 @@
         </p:nvCxnSpPr>
         <p:spPr>
           <a:xfrm>
-            <a:off x="3610267" y="2531079"/>
-            <a:ext cx="170300" cy="0"/>
+            <a:off x="3546567" y="2533103"/>
+            <a:ext cx="234000" cy="0"/>
           </a:xfrm>
           <a:prstGeom prst="straightConnector1">
             <a:avLst/>
@@ -6943,8 +6943,8 @@
         </p:nvCxnSpPr>
         <p:spPr>
           <a:xfrm flipV="1">
-            <a:off x="3412267" y="2531079"/>
-            <a:ext cx="198000" cy="6715"/>
+            <a:off x="3312567" y="2533104"/>
+            <a:ext cx="234000" cy="3357"/>
           </a:xfrm>
           <a:prstGeom prst="straightConnector1">
             <a:avLst/>
@@ -6985,8 +6985,8 @@
         </p:nvCxnSpPr>
         <p:spPr>
           <a:xfrm>
-            <a:off x="2736567" y="2537795"/>
-            <a:ext cx="675700" cy="0"/>
+            <a:off x="2736567" y="2536461"/>
+            <a:ext cx="576000" cy="0"/>
           </a:xfrm>
           <a:prstGeom prst="straightConnector1">
             <a:avLst/>
@@ -7025,7 +7025,7 @@
         </p:nvSpPr>
         <p:spPr>
           <a:xfrm>
-            <a:off x="2600360" y="2362649"/>
+            <a:off x="2583361" y="2379836"/>
             <a:ext cx="954507" cy="169277"/>
           </a:xfrm>
           <a:prstGeom prst="rect">
@@ -7059,7 +7059,7 @@
                 <a:latin typeface="Arial" panose="020B0604020202020204" pitchFamily="34" charset="0"/>
                 <a:cs typeface="Arial" panose="020B0604020202020204" pitchFamily="34" charset="0"/>
               </a:rPr>
-              <a:t>=180</a:t>
+              <a:t>=160</a:t>
             </a:r>
           </a:p>
         </p:txBody>
@@ -7078,7 +7078,7 @@
         </p:nvSpPr>
         <p:spPr>
           <a:xfrm>
-            <a:off x="2230546" y="2374908"/>
+            <a:off x="2230545" y="2378268"/>
             <a:ext cx="778043" cy="169277"/>
           </a:xfrm>
           <a:prstGeom prst="rect">
@@ -7112,7 +7112,7 @@
                 <a:latin typeface="Arial" panose="020B0604020202020204" pitchFamily="34" charset="0"/>
                 <a:cs typeface="Arial" panose="020B0604020202020204" pitchFamily="34" charset="0"/>
               </a:rPr>
-              <a:t>=55</a:t>
+              <a:t>=65</a:t>
             </a:r>
           </a:p>
         </p:txBody>
@@ -7131,8 +7131,8 @@
         </p:nvSpPr>
         <p:spPr>
           <a:xfrm>
-            <a:off x="3312228" y="2362648"/>
-            <a:ext cx="378253" cy="169277"/>
+            <a:off x="3199099" y="2381404"/>
+            <a:ext cx="426335" cy="169277"/>
           </a:xfrm>
           <a:prstGeom prst="rect">
             <a:avLst/>
@@ -7165,7 +7165,7 @@
                 <a:latin typeface="Arial" panose="020B0604020202020204" pitchFamily="34" charset="0"/>
                 <a:cs typeface="Arial" panose="020B0604020202020204" pitchFamily="34" charset="0"/>
               </a:rPr>
-              <a:t>=55</a:t>
+              <a:t>=65</a:t>
             </a:r>
           </a:p>
         </p:txBody>
@@ -7184,7 +7184,7 @@
         </p:nvSpPr>
         <p:spPr>
           <a:xfrm>
-            <a:off x="3511267" y="2361242"/>
+            <a:off x="3474664" y="2381404"/>
             <a:ext cx="377807" cy="169277"/>
           </a:xfrm>
           <a:prstGeom prst="rect">

</xml_diff>